<commit_message>
added user and input/output
</commit_message>
<xml_diff>
--- a/AIASPres.pptx
+++ b/AIASPres.pptx
@@ -10,10 +10,13 @@
     <p:sldId id="257" r:id="rId4"/>
     <p:sldId id="263" r:id="rId5"/>
     <p:sldId id="258" r:id="rId6"/>
-    <p:sldId id="261" r:id="rId7"/>
-    <p:sldId id="262" r:id="rId8"/>
-    <p:sldId id="264" r:id="rId9"/>
-    <p:sldId id="259" r:id="rId10"/>
+    <p:sldId id="266" r:id="rId7"/>
+    <p:sldId id="267" r:id="rId8"/>
+    <p:sldId id="261" r:id="rId9"/>
+    <p:sldId id="262" r:id="rId10"/>
+    <p:sldId id="264" r:id="rId11"/>
+    <p:sldId id="259" r:id="rId12"/>
+    <p:sldId id="265" r:id="rId13"/>
   </p:sldIdLst>
   <p:sldSz cx="12192000" cy="6858000"/>
   <p:notesSz cx="6858000" cy="9144000"/>
@@ -112,6 +115,11 @@
       </a:defRPr>
     </a:lvl9pPr>
   </p:defaultTextStyle>
+  <p:extLst>
+    <p:ext uri="{EFAFB233-063F-42B5-8137-9DF3F51BA10A}">
+      <p15:sldGuideLst xmlns:p15="http://schemas.microsoft.com/office/powerpoint/2012/main"/>
+    </p:ext>
+  </p:extLst>
 </p:presentation>
 </file>
 
@@ -264,7 +272,7 @@
           <a:p>
             <a:fld id="{BEC0A12F-6A7D-8841-A5A4-6740CA763864}" type="datetimeFigureOut">
               <a:rPr lang="en-DE" smtClean="0"/>
-              <a:t>24.06.25</a:t>
+              <a:t>27.06.25</a:t>
             </a:fld>
             <a:endParaRPr lang="en-DE"/>
           </a:p>
@@ -464,7 +472,7 @@
           <a:p>
             <a:fld id="{BEC0A12F-6A7D-8841-A5A4-6740CA763864}" type="datetimeFigureOut">
               <a:rPr lang="en-DE" smtClean="0"/>
-              <a:t>24.06.25</a:t>
+              <a:t>27.06.25</a:t>
             </a:fld>
             <a:endParaRPr lang="en-DE"/>
           </a:p>
@@ -674,7 +682,7 @@
           <a:p>
             <a:fld id="{BEC0A12F-6A7D-8841-A5A4-6740CA763864}" type="datetimeFigureOut">
               <a:rPr lang="en-DE" smtClean="0"/>
-              <a:t>24.06.25</a:t>
+              <a:t>27.06.25</a:t>
             </a:fld>
             <a:endParaRPr lang="en-DE"/>
           </a:p>
@@ -874,7 +882,7 @@
           <a:p>
             <a:fld id="{BEC0A12F-6A7D-8841-A5A4-6740CA763864}" type="datetimeFigureOut">
               <a:rPr lang="en-DE" smtClean="0"/>
-              <a:t>24.06.25</a:t>
+              <a:t>27.06.25</a:t>
             </a:fld>
             <a:endParaRPr lang="en-DE"/>
           </a:p>
@@ -1150,7 +1158,7 @@
           <a:p>
             <a:fld id="{BEC0A12F-6A7D-8841-A5A4-6740CA763864}" type="datetimeFigureOut">
               <a:rPr lang="en-DE" smtClean="0"/>
-              <a:t>24.06.25</a:t>
+              <a:t>27.06.25</a:t>
             </a:fld>
             <a:endParaRPr lang="en-DE"/>
           </a:p>
@@ -1418,7 +1426,7 @@
           <a:p>
             <a:fld id="{BEC0A12F-6A7D-8841-A5A4-6740CA763864}" type="datetimeFigureOut">
               <a:rPr lang="en-DE" smtClean="0"/>
-              <a:t>24.06.25</a:t>
+              <a:t>27.06.25</a:t>
             </a:fld>
             <a:endParaRPr lang="en-DE"/>
           </a:p>
@@ -1833,7 +1841,7 @@
           <a:p>
             <a:fld id="{BEC0A12F-6A7D-8841-A5A4-6740CA763864}" type="datetimeFigureOut">
               <a:rPr lang="en-DE" smtClean="0"/>
-              <a:t>24.06.25</a:t>
+              <a:t>27.06.25</a:t>
             </a:fld>
             <a:endParaRPr lang="en-DE"/>
           </a:p>
@@ -1975,7 +1983,7 @@
           <a:p>
             <a:fld id="{BEC0A12F-6A7D-8841-A5A4-6740CA763864}" type="datetimeFigureOut">
               <a:rPr lang="en-DE" smtClean="0"/>
-              <a:t>24.06.25</a:t>
+              <a:t>27.06.25</a:t>
             </a:fld>
             <a:endParaRPr lang="en-DE"/>
           </a:p>
@@ -2088,7 +2096,7 @@
           <a:p>
             <a:fld id="{BEC0A12F-6A7D-8841-A5A4-6740CA763864}" type="datetimeFigureOut">
               <a:rPr lang="en-DE" smtClean="0"/>
-              <a:t>24.06.25</a:t>
+              <a:t>27.06.25</a:t>
             </a:fld>
             <a:endParaRPr lang="en-DE"/>
           </a:p>
@@ -2401,7 +2409,7 @@
           <a:p>
             <a:fld id="{BEC0A12F-6A7D-8841-A5A4-6740CA763864}" type="datetimeFigureOut">
               <a:rPr lang="en-DE" smtClean="0"/>
-              <a:t>24.06.25</a:t>
+              <a:t>27.06.25</a:t>
             </a:fld>
             <a:endParaRPr lang="en-DE"/>
           </a:p>
@@ -2690,7 +2698,7 @@
           <a:p>
             <a:fld id="{BEC0A12F-6A7D-8841-A5A4-6740CA763864}" type="datetimeFigureOut">
               <a:rPr lang="en-DE" smtClean="0"/>
-              <a:t>24.06.25</a:t>
+              <a:t>27.06.25</a:t>
             </a:fld>
             <a:endParaRPr lang="en-DE"/>
           </a:p>
@@ -2933,7 +2941,7 @@
           <a:p>
             <a:fld id="{BEC0A12F-6A7D-8841-A5A4-6740CA763864}" type="datetimeFigureOut">
               <a:rPr lang="en-DE" smtClean="0"/>
-              <a:t>24.06.25</a:t>
+              <a:t>27.06.25</a:t>
             </a:fld>
             <a:endParaRPr lang="en-DE"/>
           </a:p>
@@ -3391,614 +3399,7 @@
 </p:sld>
 </file>
 
-<file path=ppt/slides/slide2.xml><?xml version="1.0" encoding="utf-8"?>
-<p:sld xmlns:a="http://schemas.openxmlformats.org/drawingml/2006/main" xmlns:r="http://schemas.openxmlformats.org/officeDocument/2006/relationships" xmlns:p="http://schemas.openxmlformats.org/presentationml/2006/main">
-  <p:cSld>
-    <p:spTree>
-      <p:nvGrpSpPr>
-        <p:cNvPr id="1" name=""/>
-        <p:cNvGrpSpPr/>
-        <p:nvPr/>
-      </p:nvGrpSpPr>
-      <p:grpSpPr>
-        <a:xfrm>
-          <a:off x="0" y="0"/>
-          <a:ext cx="0" cy="0"/>
-          <a:chOff x="0" y="0"/>
-          <a:chExt cx="0" cy="0"/>
-        </a:xfrm>
-      </p:grpSpPr>
-      <p:sp>
-        <p:nvSpPr>
-          <p:cNvPr id="2" name="Title 1">
-            <a:extLst>
-              <a:ext uri="{FF2B5EF4-FFF2-40B4-BE49-F238E27FC236}">
-                <a16:creationId xmlns:a16="http://schemas.microsoft.com/office/drawing/2014/main" id="{1B456A31-35E5-32B3-4B49-AA671ECB1193}"/>
-              </a:ext>
-            </a:extLst>
-          </p:cNvPr>
-          <p:cNvSpPr>
-            <a:spLocks noGrp="1"/>
-          </p:cNvSpPr>
-          <p:nvPr>
-            <p:ph type="title"/>
-          </p:nvPr>
-        </p:nvSpPr>
-        <p:spPr/>
-        <p:txBody>
-          <a:bodyPr/>
-          <a:lstStyle/>
-          <a:p>
-            <a:r>
-              <a:rPr lang="en-DE" dirty="0"/>
-              <a:t>Documentation</a:t>
-            </a:r>
-          </a:p>
-        </p:txBody>
-      </p:sp>
-      <p:sp>
-        <p:nvSpPr>
-          <p:cNvPr id="3" name="Content Placeholder 2">
-            <a:extLst>
-              <a:ext uri="{FF2B5EF4-FFF2-40B4-BE49-F238E27FC236}">
-                <a16:creationId xmlns:a16="http://schemas.microsoft.com/office/drawing/2014/main" id="{D3BA9E24-2CAB-F49D-99A5-87D0C2C0D9B3}"/>
-              </a:ext>
-            </a:extLst>
-          </p:cNvPr>
-          <p:cNvSpPr>
-            <a:spLocks noGrp="1"/>
-          </p:cNvSpPr>
-          <p:nvPr>
-            <p:ph idx="1"/>
-          </p:nvPr>
-        </p:nvSpPr>
-        <p:spPr/>
-        <p:txBody>
-          <a:bodyPr/>
-          <a:lstStyle/>
-          <a:p>
-            <a:endParaRPr lang="en-DE"/>
-          </a:p>
-        </p:txBody>
-      </p:sp>
-    </p:spTree>
-    <p:extLst>
-      <p:ext uri="{BB962C8B-B14F-4D97-AF65-F5344CB8AC3E}">
-        <p14:creationId xmlns:p14="http://schemas.microsoft.com/office/powerpoint/2010/main" val="3456268618"/>
-      </p:ext>
-    </p:extLst>
-  </p:cSld>
-  <p:clrMapOvr>
-    <a:masterClrMapping/>
-  </p:clrMapOvr>
-</p:sld>
-</file>
-
-<file path=ppt/slides/slide3.xml><?xml version="1.0" encoding="utf-8"?>
-<p:sld xmlns:a="http://schemas.openxmlformats.org/drawingml/2006/main" xmlns:r="http://schemas.openxmlformats.org/officeDocument/2006/relationships" xmlns:p="http://schemas.openxmlformats.org/presentationml/2006/main">
-  <p:cSld>
-    <p:spTree>
-      <p:nvGrpSpPr>
-        <p:cNvPr id="1" name=""/>
-        <p:cNvGrpSpPr/>
-        <p:nvPr/>
-      </p:nvGrpSpPr>
-      <p:grpSpPr>
-        <a:xfrm>
-          <a:off x="0" y="0"/>
-          <a:ext cx="0" cy="0"/>
-          <a:chOff x="0" y="0"/>
-          <a:chExt cx="0" cy="0"/>
-        </a:xfrm>
-      </p:grpSpPr>
-      <p:sp>
-        <p:nvSpPr>
-          <p:cNvPr id="2" name="Title 1">
-            <a:extLst>
-              <a:ext uri="{FF2B5EF4-FFF2-40B4-BE49-F238E27FC236}">
-                <a16:creationId xmlns:a16="http://schemas.microsoft.com/office/drawing/2014/main" id="{D12D5D62-FF58-40D6-D258-9941181C13A9}"/>
-              </a:ext>
-            </a:extLst>
-          </p:cNvPr>
-          <p:cNvSpPr>
-            <a:spLocks noGrp="1"/>
-          </p:cNvSpPr>
-          <p:nvPr>
-            <p:ph type="title"/>
-          </p:nvPr>
-        </p:nvSpPr>
-        <p:spPr/>
-        <p:txBody>
-          <a:bodyPr/>
-          <a:lstStyle/>
-          <a:p>
-            <a:r>
-              <a:rPr lang="en-DE" dirty="0"/>
-              <a:t>Elicitation</a:t>
-            </a:r>
-          </a:p>
-        </p:txBody>
-      </p:sp>
-      <p:sp>
-        <p:nvSpPr>
-          <p:cNvPr id="3" name="Content Placeholder 2">
-            <a:extLst>
-              <a:ext uri="{FF2B5EF4-FFF2-40B4-BE49-F238E27FC236}">
-                <a16:creationId xmlns:a16="http://schemas.microsoft.com/office/drawing/2014/main" id="{9CE43708-7545-3820-3387-E0ABDCF88F8B}"/>
-              </a:ext>
-            </a:extLst>
-          </p:cNvPr>
-          <p:cNvSpPr>
-            <a:spLocks noGrp="1"/>
-          </p:cNvSpPr>
-          <p:nvPr>
-            <p:ph idx="1"/>
-          </p:nvPr>
-        </p:nvSpPr>
-        <p:spPr/>
-        <p:txBody>
-          <a:bodyPr/>
-          <a:lstStyle/>
-          <a:p>
-            <a:r>
-              <a:rPr lang="en-GB" b="1" dirty="0"/>
-              <a:t>REQ1:</a:t>
-            </a:r>
-            <a:r>
-              <a:rPr lang="en-GB" dirty="0"/>
-              <a:t> The system shall provide fault-tolerant flight control by maintaining aircraft stability and command execution in the presence of multiple unexpected failure types, including actuator jams, reduced control effectiveness, structural failures, aerodynamic changes, and sensor noise.</a:t>
-            </a:r>
-            <a:endParaRPr lang="en-DE" dirty="0"/>
-          </a:p>
-        </p:txBody>
-      </p:sp>
-    </p:spTree>
-    <p:extLst>
-      <p:ext uri="{BB962C8B-B14F-4D97-AF65-F5344CB8AC3E}">
-        <p14:creationId xmlns:p14="http://schemas.microsoft.com/office/powerpoint/2010/main" val="180116877"/>
-      </p:ext>
-    </p:extLst>
-  </p:cSld>
-  <p:clrMapOvr>
-    <a:masterClrMapping/>
-  </p:clrMapOvr>
-</p:sld>
-</file>
-
-<file path=ppt/slides/slide4.xml><?xml version="1.0" encoding="utf-8"?>
-<p:sld xmlns:a="http://schemas.openxmlformats.org/drawingml/2006/main" xmlns:r="http://schemas.openxmlformats.org/officeDocument/2006/relationships" xmlns:p="http://schemas.openxmlformats.org/presentationml/2006/main">
-  <p:cSld>
-    <p:spTree>
-      <p:nvGrpSpPr>
-        <p:cNvPr id="1" name=""/>
-        <p:cNvGrpSpPr/>
-        <p:nvPr/>
-      </p:nvGrpSpPr>
-      <p:grpSpPr>
-        <a:xfrm>
-          <a:off x="0" y="0"/>
-          <a:ext cx="0" cy="0"/>
-          <a:chOff x="0" y="0"/>
-          <a:chExt cx="0" cy="0"/>
-        </a:xfrm>
-      </p:grpSpPr>
-      <p:sp>
-        <p:nvSpPr>
-          <p:cNvPr id="2" name="Title 1">
-            <a:extLst>
-              <a:ext uri="{FF2B5EF4-FFF2-40B4-BE49-F238E27FC236}">
-                <a16:creationId xmlns:a16="http://schemas.microsoft.com/office/drawing/2014/main" id="{AEB22556-B033-08D6-0716-5C99C570B10D}"/>
-              </a:ext>
-            </a:extLst>
-          </p:cNvPr>
-          <p:cNvSpPr>
-            <a:spLocks noGrp="1"/>
-          </p:cNvSpPr>
-          <p:nvPr>
-            <p:ph type="title"/>
-          </p:nvPr>
-        </p:nvSpPr>
-        <p:spPr/>
-        <p:txBody>
-          <a:bodyPr/>
-          <a:lstStyle/>
-          <a:p>
-            <a:r>
-              <a:rPr lang="en-DE" dirty="0"/>
-              <a:t>Specify System</a:t>
-            </a:r>
-          </a:p>
-        </p:txBody>
-      </p:sp>
-      <p:sp>
-        <p:nvSpPr>
-          <p:cNvPr id="3" name="Content Placeholder 2">
-            <a:extLst>
-              <a:ext uri="{FF2B5EF4-FFF2-40B4-BE49-F238E27FC236}">
-                <a16:creationId xmlns:a16="http://schemas.microsoft.com/office/drawing/2014/main" id="{BC6C2332-EAB7-BF91-E8D4-39E102586D62}"/>
-              </a:ext>
-            </a:extLst>
-          </p:cNvPr>
-          <p:cNvSpPr>
-            <a:spLocks noGrp="1"/>
-          </p:cNvSpPr>
-          <p:nvPr>
-            <p:ph idx="1"/>
-          </p:nvPr>
-        </p:nvSpPr>
-        <p:spPr/>
-        <p:txBody>
-          <a:bodyPr>
-            <a:normAutofit/>
-          </a:bodyPr>
-          <a:lstStyle/>
-          <a:p>
-            <a:r>
-              <a:rPr lang="en-GB" sz="1600" b="1" dirty="0"/>
-              <a:t>REQ2:</a:t>
-            </a:r>
-            <a:r>
-              <a:rPr lang="en-GB" sz="1600" dirty="0"/>
-              <a:t> The system shall utilize a model-free, Deep Reinforcement Learning-based (Soft Actor-Critic) control architecture for both attitude and altitude control.</a:t>
-            </a:r>
-          </a:p>
-          <a:p>
-            <a:r>
-              <a:rPr lang="en-GB" sz="1600" b="1" dirty="0"/>
-              <a:t>REQ3:</a:t>
-            </a:r>
-            <a:r>
-              <a:rPr lang="en-GB" sz="1600" dirty="0"/>
-              <a:t> The system shall implement a cascaded controller structure, where an inner-loop controller manages attitude (pitch, roll, sideslip) and an outer-loop controller manages altitude tracking.</a:t>
-            </a:r>
-          </a:p>
-          <a:p>
-            <a:r>
-              <a:rPr lang="en-GB" sz="1600" b="1" dirty="0"/>
-              <a:t>REQ4:</a:t>
-            </a:r>
-            <a:r>
-              <a:rPr lang="en-GB" sz="1600" dirty="0"/>
-              <a:t> The system shall deliver robust flight performance under varying initial flight conditions, reference signal shapes, biased sensor noise, and atmospheric disturbances.</a:t>
-            </a:r>
-          </a:p>
-          <a:p>
-            <a:r>
-              <a:rPr lang="en-GB" sz="1600" b="1" dirty="0"/>
-              <a:t>REQ5:</a:t>
-            </a:r>
-            <a:r>
-              <a:rPr lang="en-GB" sz="1600" dirty="0"/>
-              <a:t> The system shall operate at a refresh rate of at least 100 Hz, generating smooth incremental control commands to the aircraft’s elevator, aileron, and rudder.</a:t>
-            </a:r>
-          </a:p>
-          <a:p>
-            <a:r>
-              <a:rPr lang="en-GB" sz="1600" b="1" dirty="0"/>
-              <a:t>REQ6:</a:t>
-            </a:r>
-            <a:r>
-              <a:rPr lang="en-GB" sz="1600" dirty="0"/>
-              <a:t> The system shall interface with existing aircraft navigation and auto-throttle systems, commanding only control surfaces while leaving airspeed control to external systems.</a:t>
-            </a:r>
-          </a:p>
-          <a:p>
-            <a:r>
-              <a:rPr lang="en-GB" sz="1600" b="1" dirty="0"/>
-              <a:t>REQ7:</a:t>
-            </a:r>
-            <a:r>
-              <a:rPr lang="en-GB" sz="1600" dirty="0"/>
-              <a:t> The system shall be trained offline on nominal aircraft dynamics and demonstrate robust, adaptive response to failures during online operation without the need for parameter retuning or retraining.</a:t>
-            </a:r>
-          </a:p>
-          <a:p>
-            <a:r>
-              <a:rPr lang="en-GB" sz="1600" b="1" dirty="0"/>
-              <a:t>REQ8:</a:t>
-            </a:r>
-            <a:r>
-              <a:rPr lang="en-GB" sz="1600" dirty="0"/>
-              <a:t> The system shall generalize its control policy to untrained scenarios, adapting to unmodeled disturbances and maintaining performance without explicit reconfiguration.</a:t>
-            </a:r>
-          </a:p>
-          <a:p>
-            <a:endParaRPr lang="en-DE" sz="1600" dirty="0"/>
-          </a:p>
-        </p:txBody>
-      </p:sp>
-    </p:spTree>
-    <p:extLst>
-      <p:ext uri="{BB962C8B-B14F-4D97-AF65-F5344CB8AC3E}">
-        <p14:creationId xmlns:p14="http://schemas.microsoft.com/office/powerpoint/2010/main" val="2867327620"/>
-      </p:ext>
-    </p:extLst>
-  </p:cSld>
-  <p:clrMapOvr>
-    <a:masterClrMapping/>
-  </p:clrMapOvr>
-</p:sld>
-</file>
-
-<file path=ppt/slides/slide5.xml><?xml version="1.0" encoding="utf-8"?>
-<p:sld xmlns:a="http://schemas.openxmlformats.org/drawingml/2006/main" xmlns:r="http://schemas.openxmlformats.org/officeDocument/2006/relationships" xmlns:p="http://schemas.openxmlformats.org/presentationml/2006/main">
-  <p:cSld>
-    <p:spTree>
-      <p:nvGrpSpPr>
-        <p:cNvPr id="1" name=""/>
-        <p:cNvGrpSpPr/>
-        <p:nvPr/>
-      </p:nvGrpSpPr>
-      <p:grpSpPr>
-        <a:xfrm>
-          <a:off x="0" y="0"/>
-          <a:ext cx="0" cy="0"/>
-          <a:chOff x="0" y="0"/>
-          <a:chExt cx="0" cy="0"/>
-        </a:xfrm>
-      </p:grpSpPr>
-      <p:sp>
-        <p:nvSpPr>
-          <p:cNvPr id="2" name="Title 1">
-            <a:extLst>
-              <a:ext uri="{FF2B5EF4-FFF2-40B4-BE49-F238E27FC236}">
-                <a16:creationId xmlns:a16="http://schemas.microsoft.com/office/drawing/2014/main" id="{05BC657A-7B2F-00FF-0362-D6EC5E46E443}"/>
-              </a:ext>
-            </a:extLst>
-          </p:cNvPr>
-          <p:cNvSpPr>
-            <a:spLocks noGrp="1"/>
-          </p:cNvSpPr>
-          <p:nvPr>
-            <p:ph type="title"/>
-          </p:nvPr>
-        </p:nvSpPr>
-        <p:spPr/>
-        <p:txBody>
-          <a:bodyPr/>
-          <a:lstStyle/>
-          <a:p>
-            <a:r>
-              <a:rPr lang="en-DE" dirty="0"/>
-              <a:t>Specify System</a:t>
-            </a:r>
-          </a:p>
-        </p:txBody>
-      </p:sp>
-      <p:sp>
-        <p:nvSpPr>
-          <p:cNvPr id="3" name="Content Placeholder 2">
-            <a:extLst>
-              <a:ext uri="{FF2B5EF4-FFF2-40B4-BE49-F238E27FC236}">
-                <a16:creationId xmlns:a16="http://schemas.microsoft.com/office/drawing/2014/main" id="{9BF99268-9670-7103-39DB-43191691D41F}"/>
-              </a:ext>
-            </a:extLst>
-          </p:cNvPr>
-          <p:cNvSpPr>
-            <a:spLocks noGrp="1"/>
-          </p:cNvSpPr>
-          <p:nvPr>
-            <p:ph idx="1"/>
-          </p:nvPr>
-        </p:nvSpPr>
-        <p:spPr/>
-        <p:txBody>
-          <a:bodyPr/>
-          <a:lstStyle/>
-          <a:p>
-            <a:r>
-              <a:rPr lang="en-DE" dirty="0"/>
-              <a:t>Intent: In order to increase reliability of the Control System and help reduce the workload of the Flight Crew in high stress situations resulting from various failure modes, a fault tolerant flight system shall be integrated.</a:t>
-            </a:r>
-          </a:p>
-        </p:txBody>
-      </p:sp>
-    </p:spTree>
-    <p:extLst>
-      <p:ext uri="{BB962C8B-B14F-4D97-AF65-F5344CB8AC3E}">
-        <p14:creationId xmlns:p14="http://schemas.microsoft.com/office/powerpoint/2010/main" val="921602223"/>
-      </p:ext>
-    </p:extLst>
-  </p:cSld>
-  <p:clrMapOvr>
-    <a:masterClrMapping/>
-  </p:clrMapOvr>
-</p:sld>
-</file>
-
-<file path=ppt/slides/slide6.xml><?xml version="1.0" encoding="utf-8"?>
-<p:sld xmlns:a="http://schemas.openxmlformats.org/drawingml/2006/main" xmlns:r="http://schemas.openxmlformats.org/officeDocument/2006/relationships" xmlns:p="http://schemas.openxmlformats.org/presentationml/2006/main">
-  <p:cSld>
-    <p:spTree>
-      <p:nvGrpSpPr>
-        <p:cNvPr id="1" name="">
-          <a:extLst>
-            <a:ext uri="{FF2B5EF4-FFF2-40B4-BE49-F238E27FC236}">
-              <a16:creationId xmlns:a16="http://schemas.microsoft.com/office/drawing/2014/main" id="{36F13790-1F39-945B-B21E-5F54F0E0BBAF}"/>
-            </a:ext>
-          </a:extLst>
-        </p:cNvPr>
-        <p:cNvGrpSpPr/>
-        <p:nvPr/>
-      </p:nvGrpSpPr>
-      <p:grpSpPr>
-        <a:xfrm>
-          <a:off x="0" y="0"/>
-          <a:ext cx="0" cy="0"/>
-          <a:chOff x="0" y="0"/>
-          <a:chExt cx="0" cy="0"/>
-        </a:xfrm>
-      </p:grpSpPr>
-      <p:sp>
-        <p:nvSpPr>
-          <p:cNvPr id="2" name="Title 1">
-            <a:extLst>
-              <a:ext uri="{FF2B5EF4-FFF2-40B4-BE49-F238E27FC236}">
-                <a16:creationId xmlns:a16="http://schemas.microsoft.com/office/drawing/2014/main" id="{838D582C-D2D7-2F0B-F250-0F2ABDF18DB6}"/>
-              </a:ext>
-            </a:extLst>
-          </p:cNvPr>
-          <p:cNvSpPr>
-            <a:spLocks noGrp="1"/>
-          </p:cNvSpPr>
-          <p:nvPr>
-            <p:ph type="title"/>
-          </p:nvPr>
-        </p:nvSpPr>
-        <p:spPr/>
-        <p:txBody>
-          <a:bodyPr/>
-          <a:lstStyle/>
-          <a:p>
-            <a:r>
-              <a:rPr lang="en-DE" dirty="0"/>
-              <a:t>Specify System</a:t>
-            </a:r>
-          </a:p>
-        </p:txBody>
-      </p:sp>
-      <p:sp>
-        <p:nvSpPr>
-          <p:cNvPr id="3" name="Content Placeholder 2">
-            <a:extLst>
-              <a:ext uri="{FF2B5EF4-FFF2-40B4-BE49-F238E27FC236}">
-                <a16:creationId xmlns:a16="http://schemas.microsoft.com/office/drawing/2014/main" id="{7FFA2099-54EB-D319-8EE4-2B99B7AB0B7A}"/>
-              </a:ext>
-            </a:extLst>
-          </p:cNvPr>
-          <p:cNvSpPr>
-            <a:spLocks noGrp="1"/>
-          </p:cNvSpPr>
-          <p:nvPr>
-            <p:ph idx="1"/>
-          </p:nvPr>
-        </p:nvSpPr>
-        <p:spPr/>
-        <p:txBody>
-          <a:bodyPr/>
-          <a:lstStyle/>
-          <a:p>
-            <a:r>
-              <a:rPr lang="en-DE" dirty="0"/>
-              <a:t>ML Constituent: The AI controller shall generalize the different controll states</a:t>
-            </a:r>
-          </a:p>
-        </p:txBody>
-      </p:sp>
-    </p:spTree>
-    <p:extLst>
-      <p:ext uri="{BB962C8B-B14F-4D97-AF65-F5344CB8AC3E}">
-        <p14:creationId xmlns:p14="http://schemas.microsoft.com/office/powerpoint/2010/main" val="474936354"/>
-      </p:ext>
-    </p:extLst>
-  </p:cSld>
-  <p:clrMapOvr>
-    <a:masterClrMapping/>
-  </p:clrMapOvr>
-</p:sld>
-</file>
-
-<file path=ppt/slides/slide7.xml><?xml version="1.0" encoding="utf-8"?>
-<p:sld xmlns:a="http://schemas.openxmlformats.org/drawingml/2006/main" xmlns:r="http://schemas.openxmlformats.org/officeDocument/2006/relationships" xmlns:p="http://schemas.openxmlformats.org/presentationml/2006/main">
-  <p:cSld>
-    <p:spTree>
-      <p:nvGrpSpPr>
-        <p:cNvPr id="1" name="">
-          <a:extLst>
-            <a:ext uri="{FF2B5EF4-FFF2-40B4-BE49-F238E27FC236}">
-              <a16:creationId xmlns:a16="http://schemas.microsoft.com/office/drawing/2014/main" id="{E4D4F798-3265-E6AA-3E87-FC541AF57B85}"/>
-            </a:ext>
-          </a:extLst>
-        </p:cNvPr>
-        <p:cNvGrpSpPr/>
-        <p:nvPr/>
-      </p:nvGrpSpPr>
-      <p:grpSpPr>
-        <a:xfrm>
-          <a:off x="0" y="0"/>
-          <a:ext cx="0" cy="0"/>
-          <a:chOff x="0" y="0"/>
-          <a:chExt cx="0" cy="0"/>
-        </a:xfrm>
-      </p:grpSpPr>
-      <p:sp>
-        <p:nvSpPr>
-          <p:cNvPr id="2" name="Title 1">
-            <a:extLst>
-              <a:ext uri="{FF2B5EF4-FFF2-40B4-BE49-F238E27FC236}">
-                <a16:creationId xmlns:a16="http://schemas.microsoft.com/office/drawing/2014/main" id="{DE334235-C78E-218D-1AD4-94FCD460E28D}"/>
-              </a:ext>
-            </a:extLst>
-          </p:cNvPr>
-          <p:cNvSpPr>
-            <a:spLocks noGrp="1"/>
-          </p:cNvSpPr>
-          <p:nvPr>
-            <p:ph type="title"/>
-          </p:nvPr>
-        </p:nvSpPr>
-        <p:spPr/>
-        <p:txBody>
-          <a:bodyPr/>
-          <a:lstStyle/>
-          <a:p>
-            <a:r>
-              <a:rPr lang="en-DE" dirty="0"/>
-              <a:t>Specify System</a:t>
-            </a:r>
-          </a:p>
-        </p:txBody>
-      </p:sp>
-      <p:sp>
-        <p:nvSpPr>
-          <p:cNvPr id="3" name="Content Placeholder 2">
-            <a:extLst>
-              <a:ext uri="{FF2B5EF4-FFF2-40B4-BE49-F238E27FC236}">
-                <a16:creationId xmlns:a16="http://schemas.microsoft.com/office/drawing/2014/main" id="{425FE65A-088E-02D2-AE6A-6E6FE65F1580}"/>
-              </a:ext>
-            </a:extLst>
-          </p:cNvPr>
-          <p:cNvSpPr>
-            <a:spLocks noGrp="1"/>
-          </p:cNvSpPr>
-          <p:nvPr>
-            <p:ph idx="1"/>
-          </p:nvPr>
-        </p:nvSpPr>
-        <p:spPr/>
-        <p:txBody>
-          <a:bodyPr/>
-          <a:lstStyle/>
-          <a:p>
-            <a:r>
-              <a:rPr lang="en-DE" dirty="0"/>
-              <a:t>OD: </a:t>
-            </a:r>
-            <a:r>
-              <a:rPr lang="en-GB" dirty="0"/>
-              <a:t>The operational domain is </a:t>
-            </a:r>
-            <a:r>
-              <a:rPr lang="en-GB" b="1" dirty="0"/>
-              <a:t>real-time, closed-loop flight control of a jet aircraft, during all phases of normal flight, under both nominal and multiple severe failure/disturbance scenarios, at a 100 Hz rate, using only control surface commands—validated in high-fidelity simulation, and intended for experimental research aircraft.</a:t>
-            </a:r>
-          </a:p>
-        </p:txBody>
-      </p:sp>
-    </p:spTree>
-    <p:extLst>
-      <p:ext uri="{BB962C8B-B14F-4D97-AF65-F5344CB8AC3E}">
-        <p14:creationId xmlns:p14="http://schemas.microsoft.com/office/powerpoint/2010/main" val="3285643825"/>
-      </p:ext>
-    </p:extLst>
-  </p:cSld>
-  <p:clrMapOvr>
-    <a:masterClrMapping/>
-  </p:clrMapOvr>
-</p:sld>
-</file>
-
-<file path=ppt/slides/slide8.xml><?xml version="1.0" encoding="utf-8"?>
+<file path=ppt/slides/slide10.xml><?xml version="1.0" encoding="utf-8"?>
 <p:sld xmlns:a="http://schemas.openxmlformats.org/drawingml/2006/main" xmlns:r="http://schemas.openxmlformats.org/officeDocument/2006/relationships" xmlns:p="http://schemas.openxmlformats.org/presentationml/2006/main">
   <p:cSld>
     <p:spTree>
@@ -4649,7 +4050,7 @@
 </p:sld>
 </file>
 
-<file path=ppt/slides/slide9.xml><?xml version="1.0" encoding="utf-8"?>
+<file path=ppt/slides/slide11.xml><?xml version="1.0" encoding="utf-8"?>
 <p:sld xmlns:a="http://schemas.openxmlformats.org/drawingml/2006/main" xmlns:r="http://schemas.openxmlformats.org/officeDocument/2006/relationships" xmlns:p="http://schemas.openxmlformats.org/presentationml/2006/main">
   <p:cSld>
     <p:spTree>
@@ -4723,6 +4124,1066 @@
     <p:extLst>
       <p:ext uri="{BB962C8B-B14F-4D97-AF65-F5344CB8AC3E}">
         <p14:creationId xmlns:p14="http://schemas.microsoft.com/office/powerpoint/2010/main" val="3385256987"/>
+      </p:ext>
+    </p:extLst>
+  </p:cSld>
+  <p:clrMapOvr>
+    <a:masterClrMapping/>
+  </p:clrMapOvr>
+</p:sld>
+</file>
+
+<file path=ppt/slides/slide12.xml><?xml version="1.0" encoding="utf-8"?>
+<p:sld xmlns:a="http://schemas.openxmlformats.org/drawingml/2006/main" xmlns:r="http://schemas.openxmlformats.org/officeDocument/2006/relationships" xmlns:p="http://schemas.openxmlformats.org/presentationml/2006/main">
+  <p:cSld>
+    <p:spTree>
+      <p:nvGrpSpPr>
+        <p:cNvPr id="1" name=""/>
+        <p:cNvGrpSpPr/>
+        <p:nvPr/>
+      </p:nvGrpSpPr>
+      <p:grpSpPr>
+        <a:xfrm>
+          <a:off x="0" y="0"/>
+          <a:ext cx="0" cy="0"/>
+          <a:chOff x="0" y="0"/>
+          <a:chExt cx="0" cy="0"/>
+        </a:xfrm>
+      </p:grpSpPr>
+      <p:sp>
+        <p:nvSpPr>
+          <p:cNvPr id="2" name="Title 1">
+            <a:extLst>
+              <a:ext uri="{FF2B5EF4-FFF2-40B4-BE49-F238E27FC236}">
+                <a16:creationId xmlns:a16="http://schemas.microsoft.com/office/drawing/2014/main" id="{F436629D-8EC8-D953-C687-888D0781E208}"/>
+              </a:ext>
+            </a:extLst>
+          </p:cNvPr>
+          <p:cNvSpPr>
+            <a:spLocks noGrp="1"/>
+          </p:cNvSpPr>
+          <p:nvPr>
+            <p:ph type="title"/>
+          </p:nvPr>
+        </p:nvSpPr>
+        <p:spPr/>
+        <p:txBody>
+          <a:bodyPr/>
+          <a:lstStyle/>
+          <a:p>
+            <a:r>
+              <a:rPr lang="en-DE" dirty="0"/>
+              <a:t>Requirements</a:t>
+            </a:r>
+          </a:p>
+        </p:txBody>
+      </p:sp>
+      <p:sp>
+        <p:nvSpPr>
+          <p:cNvPr id="3" name="Content Placeholder 2">
+            <a:extLst>
+              <a:ext uri="{FF2B5EF4-FFF2-40B4-BE49-F238E27FC236}">
+                <a16:creationId xmlns:a16="http://schemas.microsoft.com/office/drawing/2014/main" id="{C1160A32-5B41-D485-E8B1-6D3AB715032C}"/>
+              </a:ext>
+            </a:extLst>
+          </p:cNvPr>
+          <p:cNvSpPr>
+            <a:spLocks noGrp="1"/>
+          </p:cNvSpPr>
+          <p:nvPr>
+            <p:ph idx="1"/>
+          </p:nvPr>
+        </p:nvSpPr>
+        <p:spPr/>
+        <p:txBody>
+          <a:bodyPr/>
+          <a:lstStyle/>
+          <a:p>
+            <a:r>
+              <a:rPr lang="en-DE" dirty="0"/>
+              <a:t>Functional Requirements:</a:t>
+            </a:r>
+          </a:p>
+          <a:p>
+            <a:endParaRPr lang="en-DE" dirty="0"/>
+          </a:p>
+          <a:p>
+            <a:endParaRPr lang="en-DE" dirty="0"/>
+          </a:p>
+          <a:p>
+            <a:pPr marL="0" indent="0">
+              <a:buNone/>
+            </a:pPr>
+            <a:endParaRPr lang="en-DE" dirty="0"/>
+          </a:p>
+          <a:p>
+            <a:r>
+              <a:rPr lang="en-DE" dirty="0"/>
+              <a:t>N</a:t>
+            </a:r>
+            <a:r>
+              <a:rPr lang="en-GB" dirty="0"/>
+              <a:t>o</a:t>
+            </a:r>
+            <a:r>
+              <a:rPr lang="en-DE" dirty="0"/>
+              <a:t>n- Functional Requirements:</a:t>
+            </a:r>
+          </a:p>
+        </p:txBody>
+      </p:sp>
+    </p:spTree>
+    <p:extLst>
+      <p:ext uri="{BB962C8B-B14F-4D97-AF65-F5344CB8AC3E}">
+        <p14:creationId xmlns:p14="http://schemas.microsoft.com/office/powerpoint/2010/main" val="449500475"/>
+      </p:ext>
+    </p:extLst>
+  </p:cSld>
+  <p:clrMapOvr>
+    <a:masterClrMapping/>
+  </p:clrMapOvr>
+</p:sld>
+</file>
+
+<file path=ppt/slides/slide2.xml><?xml version="1.0" encoding="utf-8"?>
+<p:sld xmlns:a="http://schemas.openxmlformats.org/drawingml/2006/main" xmlns:r="http://schemas.openxmlformats.org/officeDocument/2006/relationships" xmlns:p="http://schemas.openxmlformats.org/presentationml/2006/main">
+  <p:cSld>
+    <p:spTree>
+      <p:nvGrpSpPr>
+        <p:cNvPr id="1" name=""/>
+        <p:cNvGrpSpPr/>
+        <p:nvPr/>
+      </p:nvGrpSpPr>
+      <p:grpSpPr>
+        <a:xfrm>
+          <a:off x="0" y="0"/>
+          <a:ext cx="0" cy="0"/>
+          <a:chOff x="0" y="0"/>
+          <a:chExt cx="0" cy="0"/>
+        </a:xfrm>
+      </p:grpSpPr>
+      <p:sp>
+        <p:nvSpPr>
+          <p:cNvPr id="2" name="Title 1">
+            <a:extLst>
+              <a:ext uri="{FF2B5EF4-FFF2-40B4-BE49-F238E27FC236}">
+                <a16:creationId xmlns:a16="http://schemas.microsoft.com/office/drawing/2014/main" id="{1B456A31-35E5-32B3-4B49-AA671ECB1193}"/>
+              </a:ext>
+            </a:extLst>
+          </p:cNvPr>
+          <p:cNvSpPr>
+            <a:spLocks noGrp="1"/>
+          </p:cNvSpPr>
+          <p:nvPr>
+            <p:ph type="title"/>
+          </p:nvPr>
+        </p:nvSpPr>
+        <p:spPr/>
+        <p:txBody>
+          <a:bodyPr/>
+          <a:lstStyle/>
+          <a:p>
+            <a:r>
+              <a:rPr lang="en-DE" dirty="0"/>
+              <a:t>Documentation</a:t>
+            </a:r>
+          </a:p>
+        </p:txBody>
+      </p:sp>
+      <p:sp>
+        <p:nvSpPr>
+          <p:cNvPr id="3" name="Content Placeholder 2">
+            <a:extLst>
+              <a:ext uri="{FF2B5EF4-FFF2-40B4-BE49-F238E27FC236}">
+                <a16:creationId xmlns:a16="http://schemas.microsoft.com/office/drawing/2014/main" id="{D3BA9E24-2CAB-F49D-99A5-87D0C2C0D9B3}"/>
+              </a:ext>
+            </a:extLst>
+          </p:cNvPr>
+          <p:cNvSpPr>
+            <a:spLocks noGrp="1"/>
+          </p:cNvSpPr>
+          <p:nvPr>
+            <p:ph idx="1"/>
+          </p:nvPr>
+        </p:nvSpPr>
+        <p:spPr/>
+        <p:txBody>
+          <a:bodyPr/>
+          <a:lstStyle/>
+          <a:p>
+            <a:endParaRPr lang="en-DE"/>
+          </a:p>
+        </p:txBody>
+      </p:sp>
+    </p:spTree>
+    <p:extLst>
+      <p:ext uri="{BB962C8B-B14F-4D97-AF65-F5344CB8AC3E}">
+        <p14:creationId xmlns:p14="http://schemas.microsoft.com/office/powerpoint/2010/main" val="3456268618"/>
+      </p:ext>
+    </p:extLst>
+  </p:cSld>
+  <p:clrMapOvr>
+    <a:masterClrMapping/>
+  </p:clrMapOvr>
+</p:sld>
+</file>
+
+<file path=ppt/slides/slide3.xml><?xml version="1.0" encoding="utf-8"?>
+<p:sld xmlns:a="http://schemas.openxmlformats.org/drawingml/2006/main" xmlns:r="http://schemas.openxmlformats.org/officeDocument/2006/relationships" xmlns:p="http://schemas.openxmlformats.org/presentationml/2006/main">
+  <p:cSld>
+    <p:spTree>
+      <p:nvGrpSpPr>
+        <p:cNvPr id="1" name=""/>
+        <p:cNvGrpSpPr/>
+        <p:nvPr/>
+      </p:nvGrpSpPr>
+      <p:grpSpPr>
+        <a:xfrm>
+          <a:off x="0" y="0"/>
+          <a:ext cx="0" cy="0"/>
+          <a:chOff x="0" y="0"/>
+          <a:chExt cx="0" cy="0"/>
+        </a:xfrm>
+      </p:grpSpPr>
+      <p:sp>
+        <p:nvSpPr>
+          <p:cNvPr id="2" name="Title 1">
+            <a:extLst>
+              <a:ext uri="{FF2B5EF4-FFF2-40B4-BE49-F238E27FC236}">
+                <a16:creationId xmlns:a16="http://schemas.microsoft.com/office/drawing/2014/main" id="{D12D5D62-FF58-40D6-D258-9941181C13A9}"/>
+              </a:ext>
+            </a:extLst>
+          </p:cNvPr>
+          <p:cNvSpPr>
+            <a:spLocks noGrp="1"/>
+          </p:cNvSpPr>
+          <p:nvPr>
+            <p:ph type="title"/>
+          </p:nvPr>
+        </p:nvSpPr>
+        <p:spPr/>
+        <p:txBody>
+          <a:bodyPr/>
+          <a:lstStyle/>
+          <a:p>
+            <a:r>
+              <a:rPr lang="en-DE" dirty="0"/>
+              <a:t>Elicitation</a:t>
+            </a:r>
+          </a:p>
+        </p:txBody>
+      </p:sp>
+      <p:sp>
+        <p:nvSpPr>
+          <p:cNvPr id="3" name="Content Placeholder 2">
+            <a:extLst>
+              <a:ext uri="{FF2B5EF4-FFF2-40B4-BE49-F238E27FC236}">
+                <a16:creationId xmlns:a16="http://schemas.microsoft.com/office/drawing/2014/main" id="{9CE43708-7545-3820-3387-E0ABDCF88F8B}"/>
+              </a:ext>
+            </a:extLst>
+          </p:cNvPr>
+          <p:cNvSpPr>
+            <a:spLocks noGrp="1"/>
+          </p:cNvSpPr>
+          <p:nvPr>
+            <p:ph idx="1"/>
+          </p:nvPr>
+        </p:nvSpPr>
+        <p:spPr/>
+        <p:txBody>
+          <a:bodyPr/>
+          <a:lstStyle/>
+          <a:p>
+            <a:r>
+              <a:rPr lang="en-GB" b="1" dirty="0"/>
+              <a:t>REQ1:</a:t>
+            </a:r>
+            <a:r>
+              <a:rPr lang="en-GB" dirty="0"/>
+              <a:t> The system shall provide fault-tolerant flight control by maintaining aircraft stability and command execution in the presence of multiple unexpected failure types, including actuator jams, reduced control effectiveness, structural failures, aerodynamic changes, and sensor noise.</a:t>
+            </a:r>
+            <a:endParaRPr lang="en-DE" dirty="0"/>
+          </a:p>
+        </p:txBody>
+      </p:sp>
+    </p:spTree>
+    <p:extLst>
+      <p:ext uri="{BB962C8B-B14F-4D97-AF65-F5344CB8AC3E}">
+        <p14:creationId xmlns:p14="http://schemas.microsoft.com/office/powerpoint/2010/main" val="180116877"/>
+      </p:ext>
+    </p:extLst>
+  </p:cSld>
+  <p:clrMapOvr>
+    <a:masterClrMapping/>
+  </p:clrMapOvr>
+</p:sld>
+</file>
+
+<file path=ppt/slides/slide4.xml><?xml version="1.0" encoding="utf-8"?>
+<p:sld xmlns:a="http://schemas.openxmlformats.org/drawingml/2006/main" xmlns:r="http://schemas.openxmlformats.org/officeDocument/2006/relationships" xmlns:p="http://schemas.openxmlformats.org/presentationml/2006/main">
+  <p:cSld>
+    <p:spTree>
+      <p:nvGrpSpPr>
+        <p:cNvPr id="1" name=""/>
+        <p:cNvGrpSpPr/>
+        <p:nvPr/>
+      </p:nvGrpSpPr>
+      <p:grpSpPr>
+        <a:xfrm>
+          <a:off x="0" y="0"/>
+          <a:ext cx="0" cy="0"/>
+          <a:chOff x="0" y="0"/>
+          <a:chExt cx="0" cy="0"/>
+        </a:xfrm>
+      </p:grpSpPr>
+      <p:sp>
+        <p:nvSpPr>
+          <p:cNvPr id="2" name="Title 1">
+            <a:extLst>
+              <a:ext uri="{FF2B5EF4-FFF2-40B4-BE49-F238E27FC236}">
+                <a16:creationId xmlns:a16="http://schemas.microsoft.com/office/drawing/2014/main" id="{AEB22556-B033-08D6-0716-5C99C570B10D}"/>
+              </a:ext>
+            </a:extLst>
+          </p:cNvPr>
+          <p:cNvSpPr>
+            <a:spLocks noGrp="1"/>
+          </p:cNvSpPr>
+          <p:nvPr>
+            <p:ph type="title"/>
+          </p:nvPr>
+        </p:nvSpPr>
+        <p:spPr/>
+        <p:txBody>
+          <a:bodyPr/>
+          <a:lstStyle/>
+          <a:p>
+            <a:r>
+              <a:rPr lang="en-DE" dirty="0"/>
+              <a:t>Specify System</a:t>
+            </a:r>
+          </a:p>
+        </p:txBody>
+      </p:sp>
+      <p:sp>
+        <p:nvSpPr>
+          <p:cNvPr id="3" name="Content Placeholder 2">
+            <a:extLst>
+              <a:ext uri="{FF2B5EF4-FFF2-40B4-BE49-F238E27FC236}">
+                <a16:creationId xmlns:a16="http://schemas.microsoft.com/office/drawing/2014/main" id="{BC6C2332-EAB7-BF91-E8D4-39E102586D62}"/>
+              </a:ext>
+            </a:extLst>
+          </p:cNvPr>
+          <p:cNvSpPr>
+            <a:spLocks noGrp="1"/>
+          </p:cNvSpPr>
+          <p:nvPr>
+            <p:ph idx="1"/>
+          </p:nvPr>
+        </p:nvSpPr>
+        <p:spPr/>
+        <p:txBody>
+          <a:bodyPr>
+            <a:normAutofit/>
+          </a:bodyPr>
+          <a:lstStyle/>
+          <a:p>
+            <a:r>
+              <a:rPr lang="en-GB" sz="1600" b="1" dirty="0"/>
+              <a:t>REQ2:</a:t>
+            </a:r>
+            <a:r>
+              <a:rPr lang="en-GB" sz="1600" dirty="0"/>
+              <a:t> The system shall utilize a model-free, Deep Reinforcement Learning-based (Soft Actor-Critic) control architecture for both attitude and altitude control.</a:t>
+            </a:r>
+          </a:p>
+          <a:p>
+            <a:r>
+              <a:rPr lang="en-GB" sz="1600" b="1" dirty="0"/>
+              <a:t>REQ3:</a:t>
+            </a:r>
+            <a:r>
+              <a:rPr lang="en-GB" sz="1600" dirty="0"/>
+              <a:t> The system shall implement a cascaded controller structure, where an inner-loop controller manages attitude (pitch, roll, sideslip) and an outer-loop controller manages altitude tracking.</a:t>
+            </a:r>
+          </a:p>
+          <a:p>
+            <a:r>
+              <a:rPr lang="en-GB" sz="1600" b="1" dirty="0"/>
+              <a:t>REQ4:</a:t>
+            </a:r>
+            <a:r>
+              <a:rPr lang="en-GB" sz="1600" dirty="0"/>
+              <a:t> The system shall deliver robust flight performance under varying initial flight conditions, reference signal shapes, biased sensor noise, and atmospheric disturbances.</a:t>
+            </a:r>
+          </a:p>
+          <a:p>
+            <a:r>
+              <a:rPr lang="en-GB" sz="1600" b="1" dirty="0"/>
+              <a:t>REQ5:</a:t>
+            </a:r>
+            <a:r>
+              <a:rPr lang="en-GB" sz="1600" dirty="0"/>
+              <a:t> The system shall operate at a refresh rate of at least 100 Hz, generating smooth incremental control commands to the aircraft’s elevator, aileron, and rudder.</a:t>
+            </a:r>
+          </a:p>
+          <a:p>
+            <a:r>
+              <a:rPr lang="en-GB" sz="1600" b="1" dirty="0"/>
+              <a:t>REQ6:</a:t>
+            </a:r>
+            <a:r>
+              <a:rPr lang="en-GB" sz="1600" dirty="0"/>
+              <a:t> The system shall interface with existing aircraft navigation and auto-throttle systems, commanding only control surfaces while leaving airspeed control to external systems.</a:t>
+            </a:r>
+          </a:p>
+          <a:p>
+            <a:r>
+              <a:rPr lang="en-GB" sz="1600" b="1" dirty="0"/>
+              <a:t>REQ7:</a:t>
+            </a:r>
+            <a:r>
+              <a:rPr lang="en-GB" sz="1600" dirty="0"/>
+              <a:t> The system shall be trained offline on nominal aircraft dynamics and demonstrate robust, adaptive response to failures during online operation without the need for parameter retuning or retraining.</a:t>
+            </a:r>
+          </a:p>
+          <a:p>
+            <a:r>
+              <a:rPr lang="en-GB" sz="1600" b="1" dirty="0"/>
+              <a:t>REQ8:</a:t>
+            </a:r>
+            <a:r>
+              <a:rPr lang="en-GB" sz="1600" dirty="0"/>
+              <a:t> The system shall generalize its control policy to untrained scenarios, adapting to unmodeled disturbances and maintaining performance without explicit reconfiguration.</a:t>
+            </a:r>
+          </a:p>
+          <a:p>
+            <a:endParaRPr lang="en-DE" sz="1600" dirty="0"/>
+          </a:p>
+        </p:txBody>
+      </p:sp>
+    </p:spTree>
+    <p:extLst>
+      <p:ext uri="{BB962C8B-B14F-4D97-AF65-F5344CB8AC3E}">
+        <p14:creationId xmlns:p14="http://schemas.microsoft.com/office/powerpoint/2010/main" val="2867327620"/>
+      </p:ext>
+    </p:extLst>
+  </p:cSld>
+  <p:clrMapOvr>
+    <a:masterClrMapping/>
+  </p:clrMapOvr>
+</p:sld>
+</file>
+
+<file path=ppt/slides/slide5.xml><?xml version="1.0" encoding="utf-8"?>
+<p:sld xmlns:a="http://schemas.openxmlformats.org/drawingml/2006/main" xmlns:r="http://schemas.openxmlformats.org/officeDocument/2006/relationships" xmlns:p="http://schemas.openxmlformats.org/presentationml/2006/main">
+  <p:cSld>
+    <p:spTree>
+      <p:nvGrpSpPr>
+        <p:cNvPr id="1" name=""/>
+        <p:cNvGrpSpPr/>
+        <p:nvPr/>
+      </p:nvGrpSpPr>
+      <p:grpSpPr>
+        <a:xfrm>
+          <a:off x="0" y="0"/>
+          <a:ext cx="0" cy="0"/>
+          <a:chOff x="0" y="0"/>
+          <a:chExt cx="0" cy="0"/>
+        </a:xfrm>
+      </p:grpSpPr>
+      <p:sp>
+        <p:nvSpPr>
+          <p:cNvPr id="2" name="Title 1">
+            <a:extLst>
+              <a:ext uri="{FF2B5EF4-FFF2-40B4-BE49-F238E27FC236}">
+                <a16:creationId xmlns:a16="http://schemas.microsoft.com/office/drawing/2014/main" id="{05BC657A-7B2F-00FF-0362-D6EC5E46E443}"/>
+              </a:ext>
+            </a:extLst>
+          </p:cNvPr>
+          <p:cNvSpPr>
+            <a:spLocks noGrp="1"/>
+          </p:cNvSpPr>
+          <p:nvPr>
+            <p:ph type="title"/>
+          </p:nvPr>
+        </p:nvSpPr>
+        <p:spPr/>
+        <p:txBody>
+          <a:bodyPr/>
+          <a:lstStyle/>
+          <a:p>
+            <a:r>
+              <a:rPr lang="en-DE" dirty="0"/>
+              <a:t>Specify System</a:t>
+            </a:r>
+          </a:p>
+        </p:txBody>
+      </p:sp>
+      <p:sp>
+        <p:nvSpPr>
+          <p:cNvPr id="3" name="Content Placeholder 2">
+            <a:extLst>
+              <a:ext uri="{FF2B5EF4-FFF2-40B4-BE49-F238E27FC236}">
+                <a16:creationId xmlns:a16="http://schemas.microsoft.com/office/drawing/2014/main" id="{9BF99268-9670-7103-39DB-43191691D41F}"/>
+              </a:ext>
+            </a:extLst>
+          </p:cNvPr>
+          <p:cNvSpPr>
+            <a:spLocks noGrp="1"/>
+          </p:cNvSpPr>
+          <p:nvPr>
+            <p:ph idx="1"/>
+          </p:nvPr>
+        </p:nvSpPr>
+        <p:spPr/>
+        <p:txBody>
+          <a:bodyPr/>
+          <a:lstStyle/>
+          <a:p>
+            <a:r>
+              <a:rPr lang="en-DE" dirty="0"/>
+              <a:t>Intent: In order to increase reliability of the Control System and help reduce the workload of the Flight Crew in high stress situations resulting from various failure modes, a fault tolerant flight system shall be integrated.</a:t>
+            </a:r>
+          </a:p>
+        </p:txBody>
+      </p:sp>
+    </p:spTree>
+    <p:extLst>
+      <p:ext uri="{BB962C8B-B14F-4D97-AF65-F5344CB8AC3E}">
+        <p14:creationId xmlns:p14="http://schemas.microsoft.com/office/powerpoint/2010/main" val="921602223"/>
+      </p:ext>
+    </p:extLst>
+  </p:cSld>
+  <p:clrMapOvr>
+    <a:masterClrMapping/>
+  </p:clrMapOvr>
+</p:sld>
+</file>
+
+<file path=ppt/slides/slide6.xml><?xml version="1.0" encoding="utf-8"?>
+<p:sld xmlns:a="http://schemas.openxmlformats.org/drawingml/2006/main" xmlns:r="http://schemas.openxmlformats.org/officeDocument/2006/relationships" xmlns:p="http://schemas.openxmlformats.org/presentationml/2006/main">
+  <p:cSld>
+    <p:spTree>
+      <p:nvGrpSpPr>
+        <p:cNvPr id="1" name="">
+          <a:extLst>
+            <a:ext uri="{FF2B5EF4-FFF2-40B4-BE49-F238E27FC236}">
+              <a16:creationId xmlns:a16="http://schemas.microsoft.com/office/drawing/2014/main" id="{374215E2-1385-880A-2DE0-6E01438AE763}"/>
+            </a:ext>
+          </a:extLst>
+        </p:cNvPr>
+        <p:cNvGrpSpPr/>
+        <p:nvPr/>
+      </p:nvGrpSpPr>
+      <p:grpSpPr>
+        <a:xfrm>
+          <a:off x="0" y="0"/>
+          <a:ext cx="0" cy="0"/>
+          <a:chOff x="0" y="0"/>
+          <a:chExt cx="0" cy="0"/>
+        </a:xfrm>
+      </p:grpSpPr>
+      <p:sp>
+        <p:nvSpPr>
+          <p:cNvPr id="2" name="Title 1">
+            <a:extLst>
+              <a:ext uri="{FF2B5EF4-FFF2-40B4-BE49-F238E27FC236}">
+                <a16:creationId xmlns:a16="http://schemas.microsoft.com/office/drawing/2014/main" id="{288DAAE9-22DF-A531-D8D9-BA5904371D49}"/>
+              </a:ext>
+            </a:extLst>
+          </p:cNvPr>
+          <p:cNvSpPr>
+            <a:spLocks noGrp="1"/>
+          </p:cNvSpPr>
+          <p:nvPr>
+            <p:ph type="title"/>
+          </p:nvPr>
+        </p:nvSpPr>
+        <p:spPr/>
+        <p:txBody>
+          <a:bodyPr/>
+          <a:lstStyle/>
+          <a:p>
+            <a:r>
+              <a:rPr lang="en-DE" dirty="0"/>
+              <a:t>Specify System</a:t>
+            </a:r>
+          </a:p>
+        </p:txBody>
+      </p:sp>
+      <p:sp>
+        <p:nvSpPr>
+          <p:cNvPr id="3" name="Content Placeholder 2">
+            <a:extLst>
+              <a:ext uri="{FF2B5EF4-FFF2-40B4-BE49-F238E27FC236}">
+                <a16:creationId xmlns:a16="http://schemas.microsoft.com/office/drawing/2014/main" id="{6EFE9D78-A5E5-8F0A-31A8-7F9754C55495}"/>
+              </a:ext>
+            </a:extLst>
+          </p:cNvPr>
+          <p:cNvSpPr>
+            <a:spLocks noGrp="1"/>
+          </p:cNvSpPr>
+          <p:nvPr>
+            <p:ph idx="1"/>
+          </p:nvPr>
+        </p:nvSpPr>
+        <p:spPr/>
+        <p:txBody>
+          <a:bodyPr/>
+          <a:lstStyle/>
+          <a:p>
+            <a:r>
+              <a:rPr lang="en-DE" dirty="0"/>
+              <a:t>Users:</a:t>
+            </a:r>
+          </a:p>
+          <a:p>
+            <a:pPr lvl="1"/>
+            <a:r>
+              <a:rPr lang="en-DE" dirty="0"/>
+              <a:t>On board flight control computer/autopilot: </a:t>
+            </a:r>
+          </a:p>
+          <a:p>
+            <a:pPr lvl="2"/>
+            <a:r>
+              <a:rPr lang="en-DE" dirty="0"/>
+              <a:t>executes algorithm</a:t>
+            </a:r>
+          </a:p>
+          <a:p>
+            <a:pPr lvl="1"/>
+            <a:r>
+              <a:rPr lang="en-GB" dirty="0"/>
+              <a:t>F</a:t>
+            </a:r>
+            <a:r>
+              <a:rPr lang="en-DE" dirty="0"/>
+              <a:t>light crew:</a:t>
+            </a:r>
+          </a:p>
+          <a:p>
+            <a:pPr lvl="2"/>
+            <a:r>
+              <a:rPr lang="en-GB" dirty="0"/>
+              <a:t>R</a:t>
+            </a:r>
+            <a:r>
+              <a:rPr lang="en-DE" dirty="0"/>
+              <a:t>eceives stable aircraft and can interact with cockpit control</a:t>
+            </a:r>
+          </a:p>
+          <a:p>
+            <a:pPr lvl="1"/>
+            <a:r>
+              <a:rPr lang="en-GB" dirty="0"/>
+              <a:t>M</a:t>
+            </a:r>
+            <a:r>
+              <a:rPr lang="en-DE" dirty="0"/>
+              <a:t>aintenance and health management engineers:</a:t>
+            </a:r>
+          </a:p>
+          <a:p>
+            <a:pPr lvl="2"/>
+            <a:r>
+              <a:rPr lang="en-GB" dirty="0"/>
+              <a:t>A</a:t>
+            </a:r>
+            <a:r>
+              <a:rPr lang="en-DE" dirty="0"/>
+              <a:t>nalyse logs</a:t>
+            </a:r>
+          </a:p>
+          <a:p>
+            <a:pPr lvl="1"/>
+            <a:endParaRPr lang="en-DE" dirty="0"/>
+          </a:p>
+          <a:p>
+            <a:pPr marL="0" indent="0">
+              <a:buNone/>
+            </a:pPr>
+            <a:endParaRPr lang="en-DE" dirty="0"/>
+          </a:p>
+          <a:p>
+            <a:endParaRPr lang="en-DE" dirty="0"/>
+          </a:p>
+        </p:txBody>
+      </p:sp>
+    </p:spTree>
+    <p:extLst>
+      <p:ext uri="{BB962C8B-B14F-4D97-AF65-F5344CB8AC3E}">
+        <p14:creationId xmlns:p14="http://schemas.microsoft.com/office/powerpoint/2010/main" val="193631360"/>
+      </p:ext>
+    </p:extLst>
+  </p:cSld>
+  <p:clrMapOvr>
+    <a:masterClrMapping/>
+  </p:clrMapOvr>
+</p:sld>
+</file>
+
+<file path=ppt/slides/slide7.xml><?xml version="1.0" encoding="utf-8"?>
+<p:sld xmlns:a="http://schemas.openxmlformats.org/drawingml/2006/main" xmlns:r="http://schemas.openxmlformats.org/officeDocument/2006/relationships" xmlns:p="http://schemas.openxmlformats.org/presentationml/2006/main">
+  <p:cSld>
+    <p:spTree>
+      <p:nvGrpSpPr>
+        <p:cNvPr id="1" name="">
+          <a:extLst>
+            <a:ext uri="{FF2B5EF4-FFF2-40B4-BE49-F238E27FC236}">
+              <a16:creationId xmlns:a16="http://schemas.microsoft.com/office/drawing/2014/main" id="{0893F7B2-11DC-647C-4F74-2F05E26B8F87}"/>
+            </a:ext>
+          </a:extLst>
+        </p:cNvPr>
+        <p:cNvGrpSpPr/>
+        <p:nvPr/>
+      </p:nvGrpSpPr>
+      <p:grpSpPr>
+        <a:xfrm>
+          <a:off x="0" y="0"/>
+          <a:ext cx="0" cy="0"/>
+          <a:chOff x="0" y="0"/>
+          <a:chExt cx="0" cy="0"/>
+        </a:xfrm>
+      </p:grpSpPr>
+      <p:sp>
+        <p:nvSpPr>
+          <p:cNvPr id="2" name="Title 1">
+            <a:extLst>
+              <a:ext uri="{FF2B5EF4-FFF2-40B4-BE49-F238E27FC236}">
+                <a16:creationId xmlns:a16="http://schemas.microsoft.com/office/drawing/2014/main" id="{9DD3E4AD-F549-52B8-DA7F-F358CBE16135}"/>
+              </a:ext>
+            </a:extLst>
+          </p:cNvPr>
+          <p:cNvSpPr>
+            <a:spLocks noGrp="1"/>
+          </p:cNvSpPr>
+          <p:nvPr>
+            <p:ph type="title"/>
+          </p:nvPr>
+        </p:nvSpPr>
+        <p:spPr/>
+        <p:txBody>
+          <a:bodyPr/>
+          <a:lstStyle/>
+          <a:p>
+            <a:r>
+              <a:rPr lang="en-DE" dirty="0"/>
+              <a:t>Specify System</a:t>
+            </a:r>
+          </a:p>
+        </p:txBody>
+      </p:sp>
+      <p:sp>
+        <p:nvSpPr>
+          <p:cNvPr id="3" name="Content Placeholder 2">
+            <a:extLst>
+              <a:ext uri="{FF2B5EF4-FFF2-40B4-BE49-F238E27FC236}">
+                <a16:creationId xmlns:a16="http://schemas.microsoft.com/office/drawing/2014/main" id="{70EF2658-AAAB-B71D-A242-E49D5C4BA2A0}"/>
+              </a:ext>
+            </a:extLst>
+          </p:cNvPr>
+          <p:cNvSpPr>
+            <a:spLocks noGrp="1"/>
+          </p:cNvSpPr>
+          <p:nvPr>
+            <p:ph idx="1"/>
+          </p:nvPr>
+        </p:nvSpPr>
+        <p:spPr/>
+        <p:txBody>
+          <a:bodyPr/>
+          <a:lstStyle/>
+          <a:p>
+            <a:pPr lvl="1"/>
+            <a:r>
+              <a:rPr lang="en-DE" dirty="0"/>
+              <a:t>Inputs</a:t>
+            </a:r>
+          </a:p>
+          <a:p>
+            <a:pPr lvl="2"/>
+            <a:r>
+              <a:rPr lang="en-DE" dirty="0"/>
+              <a:t>Aircraft state vector: </a:t>
+            </a:r>
+          </a:p>
+          <a:p>
+            <a:pPr lvl="3"/>
+            <a:r>
+              <a:rPr lang="en-GB" dirty="0" err="1"/>
+              <a:t>p,q,r,V</a:t>
+            </a:r>
+            <a:r>
+              <a:rPr lang="en-GB" dirty="0"/>
+              <a:t>, alpha, beta, theta, phi, chi, h</a:t>
+            </a:r>
+          </a:p>
+          <a:p>
+            <a:pPr lvl="2"/>
+            <a:r>
+              <a:rPr lang="en-GB" dirty="0"/>
+              <a:t>Control surface positions: elevator, rudder, aileron</a:t>
+            </a:r>
+          </a:p>
+          <a:p>
+            <a:pPr lvl="2"/>
+            <a:r>
+              <a:rPr lang="en-GB" dirty="0"/>
+              <a:t>Guidance reference: h, theta, phi, beta</a:t>
+            </a:r>
+          </a:p>
+          <a:p>
+            <a:pPr lvl="2"/>
+            <a:r>
+              <a:rPr lang="en-GB" dirty="0"/>
+              <a:t>Context data: Fault flags etc.</a:t>
+            </a:r>
+          </a:p>
+          <a:p>
+            <a:pPr lvl="1"/>
+            <a:r>
+              <a:rPr lang="en-GB" dirty="0"/>
+              <a:t>Outputs</a:t>
+            </a:r>
+          </a:p>
+          <a:p>
+            <a:pPr lvl="2"/>
+            <a:r>
+              <a:rPr lang="en-GB" dirty="0"/>
+              <a:t>Inner loop attitude controller: delta(elevator, </a:t>
+            </a:r>
+            <a:r>
+              <a:rPr lang="en-GB" dirty="0" err="1"/>
+              <a:t>rudder,aileron</a:t>
+            </a:r>
+            <a:r>
+              <a:rPr lang="en-GB" dirty="0"/>
+              <a:t>)</a:t>
+            </a:r>
+          </a:p>
+          <a:p>
+            <a:pPr lvl="2"/>
+            <a:r>
+              <a:rPr lang="en-GB" dirty="0"/>
+              <a:t>Outer loop altitude controller: delta theta</a:t>
+            </a:r>
+          </a:p>
+          <a:p>
+            <a:pPr lvl="2"/>
+            <a:r>
+              <a:rPr lang="en-GB" dirty="0"/>
+              <a:t>Supervisory/ status channel: </a:t>
+            </a:r>
+            <a:endParaRPr lang="en-DE" dirty="0"/>
+          </a:p>
+          <a:p>
+            <a:pPr marL="0" indent="0">
+              <a:buNone/>
+            </a:pPr>
+            <a:endParaRPr lang="en-DE" dirty="0"/>
+          </a:p>
+          <a:p>
+            <a:endParaRPr lang="en-DE" dirty="0"/>
+          </a:p>
+        </p:txBody>
+      </p:sp>
+    </p:spTree>
+    <p:extLst>
+      <p:ext uri="{BB962C8B-B14F-4D97-AF65-F5344CB8AC3E}">
+        <p14:creationId xmlns:p14="http://schemas.microsoft.com/office/powerpoint/2010/main" val="172774000"/>
+      </p:ext>
+    </p:extLst>
+  </p:cSld>
+  <p:clrMapOvr>
+    <a:masterClrMapping/>
+  </p:clrMapOvr>
+</p:sld>
+</file>
+
+<file path=ppt/slides/slide8.xml><?xml version="1.0" encoding="utf-8"?>
+<p:sld xmlns:a="http://schemas.openxmlformats.org/drawingml/2006/main" xmlns:r="http://schemas.openxmlformats.org/officeDocument/2006/relationships" xmlns:p="http://schemas.openxmlformats.org/presentationml/2006/main">
+  <p:cSld>
+    <p:spTree>
+      <p:nvGrpSpPr>
+        <p:cNvPr id="1" name="">
+          <a:extLst>
+            <a:ext uri="{FF2B5EF4-FFF2-40B4-BE49-F238E27FC236}">
+              <a16:creationId xmlns:a16="http://schemas.microsoft.com/office/drawing/2014/main" id="{36F13790-1F39-945B-B21E-5F54F0E0BBAF}"/>
+            </a:ext>
+          </a:extLst>
+        </p:cNvPr>
+        <p:cNvGrpSpPr/>
+        <p:nvPr/>
+      </p:nvGrpSpPr>
+      <p:grpSpPr>
+        <a:xfrm>
+          <a:off x="0" y="0"/>
+          <a:ext cx="0" cy="0"/>
+          <a:chOff x="0" y="0"/>
+          <a:chExt cx="0" cy="0"/>
+        </a:xfrm>
+      </p:grpSpPr>
+      <p:sp>
+        <p:nvSpPr>
+          <p:cNvPr id="2" name="Title 1">
+            <a:extLst>
+              <a:ext uri="{FF2B5EF4-FFF2-40B4-BE49-F238E27FC236}">
+                <a16:creationId xmlns:a16="http://schemas.microsoft.com/office/drawing/2014/main" id="{838D582C-D2D7-2F0B-F250-0F2ABDF18DB6}"/>
+              </a:ext>
+            </a:extLst>
+          </p:cNvPr>
+          <p:cNvSpPr>
+            <a:spLocks noGrp="1"/>
+          </p:cNvSpPr>
+          <p:nvPr>
+            <p:ph type="title"/>
+          </p:nvPr>
+        </p:nvSpPr>
+        <p:spPr/>
+        <p:txBody>
+          <a:bodyPr/>
+          <a:lstStyle/>
+          <a:p>
+            <a:r>
+              <a:rPr lang="en-DE" dirty="0"/>
+              <a:t>Specify System</a:t>
+            </a:r>
+          </a:p>
+        </p:txBody>
+      </p:sp>
+      <p:sp>
+        <p:nvSpPr>
+          <p:cNvPr id="3" name="Content Placeholder 2">
+            <a:extLst>
+              <a:ext uri="{FF2B5EF4-FFF2-40B4-BE49-F238E27FC236}">
+                <a16:creationId xmlns:a16="http://schemas.microsoft.com/office/drawing/2014/main" id="{7FFA2099-54EB-D319-8EE4-2B99B7AB0B7A}"/>
+              </a:ext>
+            </a:extLst>
+          </p:cNvPr>
+          <p:cNvSpPr>
+            <a:spLocks noGrp="1"/>
+          </p:cNvSpPr>
+          <p:nvPr>
+            <p:ph idx="1"/>
+          </p:nvPr>
+        </p:nvSpPr>
+        <p:spPr/>
+        <p:txBody>
+          <a:bodyPr/>
+          <a:lstStyle/>
+          <a:p>
+            <a:r>
+              <a:rPr lang="en-DE" dirty="0"/>
+              <a:t>ML Constituent: The AI controller shall generalize the different controll states</a:t>
+            </a:r>
+          </a:p>
+        </p:txBody>
+      </p:sp>
+    </p:spTree>
+    <p:extLst>
+      <p:ext uri="{BB962C8B-B14F-4D97-AF65-F5344CB8AC3E}">
+        <p14:creationId xmlns:p14="http://schemas.microsoft.com/office/powerpoint/2010/main" val="474936354"/>
+      </p:ext>
+    </p:extLst>
+  </p:cSld>
+  <p:clrMapOvr>
+    <a:masterClrMapping/>
+  </p:clrMapOvr>
+</p:sld>
+</file>
+
+<file path=ppt/slides/slide9.xml><?xml version="1.0" encoding="utf-8"?>
+<p:sld xmlns:a="http://schemas.openxmlformats.org/drawingml/2006/main" xmlns:r="http://schemas.openxmlformats.org/officeDocument/2006/relationships" xmlns:p="http://schemas.openxmlformats.org/presentationml/2006/main">
+  <p:cSld>
+    <p:spTree>
+      <p:nvGrpSpPr>
+        <p:cNvPr id="1" name="">
+          <a:extLst>
+            <a:ext uri="{FF2B5EF4-FFF2-40B4-BE49-F238E27FC236}">
+              <a16:creationId xmlns:a16="http://schemas.microsoft.com/office/drawing/2014/main" id="{E4D4F798-3265-E6AA-3E87-FC541AF57B85}"/>
+            </a:ext>
+          </a:extLst>
+        </p:cNvPr>
+        <p:cNvGrpSpPr/>
+        <p:nvPr/>
+      </p:nvGrpSpPr>
+      <p:grpSpPr>
+        <a:xfrm>
+          <a:off x="0" y="0"/>
+          <a:ext cx="0" cy="0"/>
+          <a:chOff x="0" y="0"/>
+          <a:chExt cx="0" cy="0"/>
+        </a:xfrm>
+      </p:grpSpPr>
+      <p:sp>
+        <p:nvSpPr>
+          <p:cNvPr id="2" name="Title 1">
+            <a:extLst>
+              <a:ext uri="{FF2B5EF4-FFF2-40B4-BE49-F238E27FC236}">
+                <a16:creationId xmlns:a16="http://schemas.microsoft.com/office/drawing/2014/main" id="{DE334235-C78E-218D-1AD4-94FCD460E28D}"/>
+              </a:ext>
+            </a:extLst>
+          </p:cNvPr>
+          <p:cNvSpPr>
+            <a:spLocks noGrp="1"/>
+          </p:cNvSpPr>
+          <p:nvPr>
+            <p:ph type="title"/>
+          </p:nvPr>
+        </p:nvSpPr>
+        <p:spPr/>
+        <p:txBody>
+          <a:bodyPr/>
+          <a:lstStyle/>
+          <a:p>
+            <a:r>
+              <a:rPr lang="en-DE" dirty="0"/>
+              <a:t>Specify System</a:t>
+            </a:r>
+          </a:p>
+        </p:txBody>
+      </p:sp>
+      <p:sp>
+        <p:nvSpPr>
+          <p:cNvPr id="3" name="Content Placeholder 2">
+            <a:extLst>
+              <a:ext uri="{FF2B5EF4-FFF2-40B4-BE49-F238E27FC236}">
+                <a16:creationId xmlns:a16="http://schemas.microsoft.com/office/drawing/2014/main" id="{425FE65A-088E-02D2-AE6A-6E6FE65F1580}"/>
+              </a:ext>
+            </a:extLst>
+          </p:cNvPr>
+          <p:cNvSpPr>
+            <a:spLocks noGrp="1"/>
+          </p:cNvSpPr>
+          <p:nvPr>
+            <p:ph idx="1"/>
+          </p:nvPr>
+        </p:nvSpPr>
+        <p:spPr/>
+        <p:txBody>
+          <a:bodyPr/>
+          <a:lstStyle/>
+          <a:p>
+            <a:r>
+              <a:rPr lang="en-DE" dirty="0"/>
+              <a:t>OD: </a:t>
+            </a:r>
+            <a:r>
+              <a:rPr lang="en-GB" dirty="0"/>
+              <a:t>The operational domain is </a:t>
+            </a:r>
+            <a:r>
+              <a:rPr lang="en-GB" b="1" dirty="0"/>
+              <a:t>real-time, closed-loop flight control of a jet aircraft, during all phases of normal flight, under both nominal and multiple severe failure/disturbance scenarios, at a 100 Hz rate, using only control surface commands—validated in high-fidelity simulation, and intended for experimental research aircraft.</a:t>
+            </a:r>
+          </a:p>
+        </p:txBody>
+      </p:sp>
+    </p:spTree>
+    <p:extLst>
+      <p:ext uri="{BB962C8B-B14F-4D97-AF65-F5344CB8AC3E}">
+        <p14:creationId xmlns:p14="http://schemas.microsoft.com/office/powerpoint/2010/main" val="3285643825"/>
       </p:ext>
     </p:extLst>
   </p:cSld>

</xml_diff>